<commit_message>
changes in pz analis continues
</commit_message>
<xml_diff>
--- a/pz_stuff/Prezentatsia_predlozhenia.pptx
+++ b/pz_stuff/Prezentatsia_predlozhenia.pptx
@@ -268,7 +268,7 @@
             <a:fld id="{A2C0772A-8435-40D0-8D87-2C2DB7B0E7B0}" type="datetimeFigureOut">
               <a:rPr lang="ru-RU" smtClean="0"/>
               <a:pPr/>
-              <a:t>16.06.2021</a:t>
+              <a:t>17.06.2021</a:t>
             </a:fld>
             <a:endParaRPr lang="ru-RU"/>
           </a:p>
@@ -440,7 +440,7 @@
             <a:fld id="{A2C0772A-8435-40D0-8D87-2C2DB7B0E7B0}" type="datetimeFigureOut">
               <a:rPr lang="ru-RU" smtClean="0"/>
               <a:pPr/>
-              <a:t>16.06.2021</a:t>
+              <a:t>17.06.2021</a:t>
             </a:fld>
             <a:endParaRPr lang="ru-RU"/>
           </a:p>
@@ -622,7 +622,7 @@
             <a:fld id="{A2C0772A-8435-40D0-8D87-2C2DB7B0E7B0}" type="datetimeFigureOut">
               <a:rPr lang="ru-RU" smtClean="0"/>
               <a:pPr/>
-              <a:t>16.06.2021</a:t>
+              <a:t>17.06.2021</a:t>
             </a:fld>
             <a:endParaRPr lang="ru-RU"/>
           </a:p>
@@ -794,7 +794,7 @@
             <a:fld id="{A2C0772A-8435-40D0-8D87-2C2DB7B0E7B0}" type="datetimeFigureOut">
               <a:rPr lang="ru-RU" smtClean="0"/>
               <a:pPr/>
-              <a:t>16.06.2021</a:t>
+              <a:t>17.06.2021</a:t>
             </a:fld>
             <a:endParaRPr lang="ru-RU"/>
           </a:p>
@@ -1042,7 +1042,7 @@
             <a:fld id="{A2C0772A-8435-40D0-8D87-2C2DB7B0E7B0}" type="datetimeFigureOut">
               <a:rPr lang="ru-RU" smtClean="0"/>
               <a:pPr/>
-              <a:t>16.06.2021</a:t>
+              <a:t>17.06.2021</a:t>
             </a:fld>
             <a:endParaRPr lang="ru-RU"/>
           </a:p>
@@ -1276,7 +1276,7 @@
             <a:fld id="{A2C0772A-8435-40D0-8D87-2C2DB7B0E7B0}" type="datetimeFigureOut">
               <a:rPr lang="ru-RU" smtClean="0"/>
               <a:pPr/>
-              <a:t>16.06.2021</a:t>
+              <a:t>17.06.2021</a:t>
             </a:fld>
             <a:endParaRPr lang="ru-RU"/>
           </a:p>
@@ -1645,7 +1645,7 @@
             <a:fld id="{A2C0772A-8435-40D0-8D87-2C2DB7B0E7B0}" type="datetimeFigureOut">
               <a:rPr lang="ru-RU" smtClean="0"/>
               <a:pPr/>
-              <a:t>16.06.2021</a:t>
+              <a:t>17.06.2021</a:t>
             </a:fld>
             <a:endParaRPr lang="ru-RU"/>
           </a:p>
@@ -1765,7 +1765,7 @@
             <a:fld id="{A2C0772A-8435-40D0-8D87-2C2DB7B0E7B0}" type="datetimeFigureOut">
               <a:rPr lang="ru-RU" smtClean="0"/>
               <a:pPr/>
-              <a:t>16.06.2021</a:t>
+              <a:t>17.06.2021</a:t>
             </a:fld>
             <a:endParaRPr lang="ru-RU"/>
           </a:p>
@@ -1862,7 +1862,7 @@
             <a:fld id="{A2C0772A-8435-40D0-8D87-2C2DB7B0E7B0}" type="datetimeFigureOut">
               <a:rPr lang="ru-RU" smtClean="0"/>
               <a:pPr/>
-              <a:t>16.06.2021</a:t>
+              <a:t>17.06.2021</a:t>
             </a:fld>
             <a:endParaRPr lang="ru-RU"/>
           </a:p>
@@ -2141,7 +2141,7 @@
             <a:fld id="{A2C0772A-8435-40D0-8D87-2C2DB7B0E7B0}" type="datetimeFigureOut">
               <a:rPr lang="ru-RU" smtClean="0"/>
               <a:pPr/>
-              <a:t>16.06.2021</a:t>
+              <a:t>17.06.2021</a:t>
             </a:fld>
             <a:endParaRPr lang="ru-RU"/>
           </a:p>
@@ -2400,7 +2400,7 @@
             <a:fld id="{A2C0772A-8435-40D0-8D87-2C2DB7B0E7B0}" type="datetimeFigureOut">
               <a:rPr lang="ru-RU" smtClean="0"/>
               <a:pPr/>
-              <a:t>16.06.2021</a:t>
+              <a:t>17.06.2021</a:t>
             </a:fld>
             <a:endParaRPr lang="ru-RU"/>
           </a:p>
@@ -2615,7 +2615,7 @@
             <a:fld id="{A2C0772A-8435-40D0-8D87-2C2DB7B0E7B0}" type="datetimeFigureOut">
               <a:rPr lang="ru-RU" smtClean="0"/>
               <a:pPr/>
-              <a:t>16.06.2021</a:t>
+              <a:t>17.06.2021</a:t>
             </a:fld>
             <a:endParaRPr lang="ru-RU"/>
           </a:p>
@@ -5112,6 +5112,41 @@
           </a:prstGeom>
         </p:spPr>
       </p:pic>
+      <p:sp>
+        <p:nvSpPr>
+          <p:cNvPr id="4" name="TextBox 3">
+            <a:extLst>
+              <a:ext uri="{FF2B5EF4-FFF2-40B4-BE49-F238E27FC236}">
+                <a16:creationId xmlns:a16="http://schemas.microsoft.com/office/drawing/2014/main" id="{731FB381-2331-4D08-BBEB-856BE1AB997F}"/>
+              </a:ext>
+            </a:extLst>
+          </p:cNvPr>
+          <p:cNvSpPr txBox="1"/>
+          <p:nvPr/>
+        </p:nvSpPr>
+        <p:spPr>
+          <a:xfrm>
+            <a:off x="3649211" y="6468020"/>
+            <a:ext cx="5209563" cy="369332"/>
+          </a:xfrm>
+          <a:prstGeom prst="rect">
+            <a:avLst/>
+          </a:prstGeom>
+          <a:noFill/>
+        </p:spPr>
+        <p:txBody>
+          <a:bodyPr wrap="square" rtlCol="0">
+            <a:spAutoFit/>
+          </a:bodyPr>
+          <a:lstStyle/>
+          <a:p>
+            <a:r>
+              <a:rPr lang="ru-RU" dirty="0"/>
+              <a:t>Рисунок 1 – организация вычислений в памяти</a:t>
+            </a:r>
+          </a:p>
+        </p:txBody>
+      </p:sp>
     </p:spTree>
     <p:extLst>
       <p:ext uri="{BB962C8B-B14F-4D97-AF65-F5344CB8AC3E}">
@@ -5800,6 +5835,41 @@
           </a:ln>
         </p:spPr>
       </p:pic>
+      <p:sp>
+        <p:nvSpPr>
+          <p:cNvPr id="5" name="TextBox 4">
+            <a:extLst>
+              <a:ext uri="{FF2B5EF4-FFF2-40B4-BE49-F238E27FC236}">
+                <a16:creationId xmlns:a16="http://schemas.microsoft.com/office/drawing/2014/main" id="{8D03C6AA-3068-4D39-881F-085254C56F37}"/>
+              </a:ext>
+            </a:extLst>
+          </p:cNvPr>
+          <p:cNvSpPr txBox="1"/>
+          <p:nvPr/>
+        </p:nvSpPr>
+        <p:spPr>
+          <a:xfrm>
+            <a:off x="4051882" y="6157086"/>
+            <a:ext cx="5209563" cy="369332"/>
+          </a:xfrm>
+          <a:prstGeom prst="rect">
+            <a:avLst/>
+          </a:prstGeom>
+          <a:noFill/>
+        </p:spPr>
+        <p:txBody>
+          <a:bodyPr wrap="square" rtlCol="0">
+            <a:spAutoFit/>
+          </a:bodyPr>
+          <a:lstStyle/>
+          <a:p>
+            <a:r>
+              <a:rPr lang="ru-RU" dirty="0"/>
+              <a:t>Рисунок 2 – Принцип работы программы</a:t>
+            </a:r>
+          </a:p>
+        </p:txBody>
+      </p:sp>
     </p:spTree>
     <p:extLst>
       <p:ext uri="{BB962C8B-B14F-4D97-AF65-F5344CB8AC3E}">
@@ -5969,6 +6039,41 @@
           </a:extLst>
         </p:spPr>
       </p:pic>
+      <p:sp>
+        <p:nvSpPr>
+          <p:cNvPr id="5" name="TextBox 4">
+            <a:extLst>
+              <a:ext uri="{FF2B5EF4-FFF2-40B4-BE49-F238E27FC236}">
+                <a16:creationId xmlns:a16="http://schemas.microsoft.com/office/drawing/2014/main" id="{B2CDCDD8-C7D9-46DA-9C3E-FBD58D5A2735}"/>
+              </a:ext>
+            </a:extLst>
+          </p:cNvPr>
+          <p:cNvSpPr txBox="1"/>
+          <p:nvPr/>
+        </p:nvSpPr>
+        <p:spPr>
+          <a:xfrm>
+            <a:off x="3791824" y="6215865"/>
+            <a:ext cx="5209563" cy="369332"/>
+          </a:xfrm>
+          <a:prstGeom prst="rect">
+            <a:avLst/>
+          </a:prstGeom>
+          <a:noFill/>
+        </p:spPr>
+        <p:txBody>
+          <a:bodyPr wrap="square" rtlCol="0">
+            <a:spAutoFit/>
+          </a:bodyPr>
+          <a:lstStyle/>
+          <a:p>
+            <a:r>
+              <a:rPr lang="ru-RU" dirty="0"/>
+              <a:t>Рисунок 3 – Методы параллельных вычислений</a:t>
+            </a:r>
+          </a:p>
+        </p:txBody>
+      </p:sp>
     </p:spTree>
     <p:extLst>
       <p:ext uri="{BB962C8B-B14F-4D97-AF65-F5344CB8AC3E}">
@@ -6111,6 +6216,41 @@
           </a:prstGeom>
         </p:spPr>
       </p:pic>
+      <p:sp>
+        <p:nvSpPr>
+          <p:cNvPr id="6" name="TextBox 5">
+            <a:extLst>
+              <a:ext uri="{FF2B5EF4-FFF2-40B4-BE49-F238E27FC236}">
+                <a16:creationId xmlns:a16="http://schemas.microsoft.com/office/drawing/2014/main" id="{A8410E05-A01A-4D60-B8E7-682E6EEEA3C0}"/>
+              </a:ext>
+            </a:extLst>
+          </p:cNvPr>
+          <p:cNvSpPr txBox="1"/>
+          <p:nvPr/>
+        </p:nvSpPr>
+        <p:spPr>
+          <a:xfrm>
+            <a:off x="3875713" y="6501251"/>
+            <a:ext cx="5209563" cy="369332"/>
+          </a:xfrm>
+          <a:prstGeom prst="rect">
+            <a:avLst/>
+          </a:prstGeom>
+          <a:noFill/>
+        </p:spPr>
+        <p:txBody>
+          <a:bodyPr wrap="square" rtlCol="0">
+            <a:spAutoFit/>
+          </a:bodyPr>
+          <a:lstStyle/>
+          <a:p>
+            <a:r>
+              <a:rPr lang="ru-RU" dirty="0"/>
+              <a:t>Рисунок 4 – Диаграмма последовательности</a:t>
+            </a:r>
+          </a:p>
+        </p:txBody>
+      </p:sp>
     </p:spTree>
     <p:extLst>
       <p:ext uri="{BB962C8B-B14F-4D97-AF65-F5344CB8AC3E}">
@@ -6307,93 +6447,6 @@
       </p:pic>
       <p:sp>
         <p:nvSpPr>
-          <p:cNvPr id="7" name="TextBox 6">
-            <a:extLst>
-              <a:ext uri="{FF2B5EF4-FFF2-40B4-BE49-F238E27FC236}">
-                <a16:creationId xmlns:a16="http://schemas.microsoft.com/office/drawing/2014/main" id="{92550A12-949A-4E83-AB67-1FDDCBB2DB30}"/>
-              </a:ext>
-            </a:extLst>
-          </p:cNvPr>
-          <p:cNvSpPr txBox="1"/>
-          <p:nvPr/>
-        </p:nvSpPr>
-        <p:spPr>
-          <a:xfrm>
-            <a:off x="1369874" y="3866381"/>
-            <a:ext cx="2974084" cy="369332"/>
-          </a:xfrm>
-          <a:prstGeom prst="rect">
-            <a:avLst/>
-          </a:prstGeom>
-          <a:noFill/>
-        </p:spPr>
-        <p:txBody>
-          <a:bodyPr wrap="none" rtlCol="0">
-            <a:spAutoFit/>
-          </a:bodyPr>
-          <a:lstStyle/>
-          <a:p>
-            <a:r>
-              <a:rPr lang="ru-RU" dirty="0">
-                <a:latin typeface="Times New Roman" panose="02020603050405020304" pitchFamily="18" charset="0"/>
-                <a:cs typeface="Times New Roman" panose="02020603050405020304" pitchFamily="18" charset="0"/>
-              </a:rPr>
-              <a:t>Равномерное распределение</a:t>
-            </a:r>
-          </a:p>
-        </p:txBody>
-      </p:sp>
-      <p:sp>
-        <p:nvSpPr>
-          <p:cNvPr id="8" name="TextBox 7">
-            <a:extLst>
-              <a:ext uri="{FF2B5EF4-FFF2-40B4-BE49-F238E27FC236}">
-                <a16:creationId xmlns:a16="http://schemas.microsoft.com/office/drawing/2014/main" id="{73861184-678B-4514-AFB4-8D837C1DBDA2}"/>
-              </a:ext>
-            </a:extLst>
-          </p:cNvPr>
-          <p:cNvSpPr txBox="1"/>
-          <p:nvPr/>
-        </p:nvSpPr>
-        <p:spPr>
-          <a:xfrm>
-            <a:off x="7305988" y="3866381"/>
-            <a:ext cx="2895344" cy="369332"/>
-          </a:xfrm>
-          <a:prstGeom prst="rect">
-            <a:avLst/>
-          </a:prstGeom>
-          <a:noFill/>
-        </p:spPr>
-        <p:txBody>
-          <a:bodyPr wrap="none" rtlCol="0">
-            <a:spAutoFit/>
-          </a:bodyPr>
-          <a:lstStyle/>
-          <a:p>
-            <a:r>
-              <a:rPr lang="ru-RU" dirty="0">
-                <a:latin typeface="Times New Roman" panose="02020603050405020304" pitchFamily="18" charset="0"/>
-                <a:cs typeface="Times New Roman" panose="02020603050405020304" pitchFamily="18" charset="0"/>
-              </a:rPr>
-              <a:t>Нормальное</a:t>
-            </a:r>
-            <a:r>
-              <a:rPr lang="ru-RU" dirty="0"/>
-              <a:t> </a:t>
-            </a:r>
-            <a:r>
-              <a:rPr lang="ru-RU" dirty="0">
-                <a:latin typeface="Times New Roman" panose="02020603050405020304" pitchFamily="18" charset="0"/>
-                <a:cs typeface="Times New Roman" panose="02020603050405020304" pitchFamily="18" charset="0"/>
-              </a:rPr>
-              <a:t>распределение</a:t>
-            </a:r>
-          </a:p>
-        </p:txBody>
-      </p:sp>
-      <p:sp>
-        <p:nvSpPr>
           <p:cNvPr id="4" name="TextBox 3">
             <a:extLst>
               <a:ext uri="{FF2B5EF4-FFF2-40B4-BE49-F238E27FC236}">
@@ -6487,6 +6540,76 @@
               <a:latin typeface="Times New Roman" panose="02020603050405020304" pitchFamily="18" charset="0"/>
               <a:cs typeface="Times New Roman" panose="02020603050405020304" pitchFamily="18" charset="0"/>
             </a:endParaRPr>
+          </a:p>
+        </p:txBody>
+      </p:sp>
+      <p:sp>
+        <p:nvSpPr>
+          <p:cNvPr id="11" name="TextBox 10">
+            <a:extLst>
+              <a:ext uri="{FF2B5EF4-FFF2-40B4-BE49-F238E27FC236}">
+                <a16:creationId xmlns:a16="http://schemas.microsoft.com/office/drawing/2014/main" id="{C94C7418-719B-4A95-96A8-77D2F806AC6E}"/>
+              </a:ext>
+            </a:extLst>
+          </p:cNvPr>
+          <p:cNvSpPr txBox="1"/>
+          <p:nvPr/>
+        </p:nvSpPr>
+        <p:spPr>
+          <a:xfrm>
+            <a:off x="480887" y="3693238"/>
+            <a:ext cx="5209563" cy="369332"/>
+          </a:xfrm>
+          <a:prstGeom prst="rect">
+            <a:avLst/>
+          </a:prstGeom>
+          <a:noFill/>
+        </p:spPr>
+        <p:txBody>
+          <a:bodyPr wrap="square" rtlCol="0">
+            <a:spAutoFit/>
+          </a:bodyPr>
+          <a:lstStyle/>
+          <a:p>
+            <a:r>
+              <a:rPr lang="ru-RU" dirty="0"/>
+              <a:t>Рисунок 5 – График равномерного распределения</a:t>
+            </a:r>
+          </a:p>
+        </p:txBody>
+      </p:sp>
+      <p:sp>
+        <p:nvSpPr>
+          <p:cNvPr id="12" name="TextBox 11">
+            <a:extLst>
+              <a:ext uri="{FF2B5EF4-FFF2-40B4-BE49-F238E27FC236}">
+                <a16:creationId xmlns:a16="http://schemas.microsoft.com/office/drawing/2014/main" id="{D7BB25A8-F212-4E46-8F34-C2B38AD4EA6D}"/>
+              </a:ext>
+            </a:extLst>
+          </p:cNvPr>
+          <p:cNvSpPr txBox="1"/>
+          <p:nvPr/>
+        </p:nvSpPr>
+        <p:spPr>
+          <a:xfrm>
+            <a:off x="6192658" y="3693238"/>
+            <a:ext cx="5209563" cy="369332"/>
+          </a:xfrm>
+          <a:prstGeom prst="rect">
+            <a:avLst/>
+          </a:prstGeom>
+          <a:noFill/>
+        </p:spPr>
+        <p:txBody>
+          <a:bodyPr wrap="square" rtlCol="0">
+            <a:spAutoFit/>
+          </a:bodyPr>
+          <a:lstStyle/>
+          <a:p>
+            <a:r>
+              <a:rPr lang="ru-RU" dirty="0"/>
+              <a:t>Рисунок 6 – График нормального распределения</a:t>
+            </a:r>
           </a:p>
         </p:txBody>
       </p:sp>
@@ -7221,6 +7344,41 @@
           </a:prstGeom>
         </p:spPr>
       </p:pic>
+      <p:sp>
+        <p:nvSpPr>
+          <p:cNvPr id="6" name="TextBox 5">
+            <a:extLst>
+              <a:ext uri="{FF2B5EF4-FFF2-40B4-BE49-F238E27FC236}">
+                <a16:creationId xmlns:a16="http://schemas.microsoft.com/office/drawing/2014/main" id="{3AB8854B-6C7D-42ED-A919-1A5318123EF4}"/>
+              </a:ext>
+            </a:extLst>
+          </p:cNvPr>
+          <p:cNvSpPr txBox="1"/>
+          <p:nvPr/>
+        </p:nvSpPr>
+        <p:spPr>
+          <a:xfrm>
+            <a:off x="263238" y="5351657"/>
+            <a:ext cx="5209563" cy="646331"/>
+          </a:xfrm>
+          <a:prstGeom prst="rect">
+            <a:avLst/>
+          </a:prstGeom>
+          <a:noFill/>
+        </p:spPr>
+        <p:txBody>
+          <a:bodyPr wrap="square" rtlCol="0">
+            <a:spAutoFit/>
+          </a:bodyPr>
+          <a:lstStyle/>
+          <a:p>
+            <a:r>
+              <a:rPr lang="ru-RU" dirty="0"/>
+              <a:t>Рисунок 7 – Последовательность первого запуска программы</a:t>
+            </a:r>
+          </a:p>
+        </p:txBody>
+      </p:sp>
     </p:spTree>
     <p:extLst>
       <p:ext uri="{BB962C8B-B14F-4D97-AF65-F5344CB8AC3E}">

</xml_diff>

<commit_message>
vvedenie i zakluchenie ostalos'
</commit_message>
<xml_diff>
--- a/pz_stuff/Prezentatsia_predlozhenia.pptx
+++ b/pz_stuff/Prezentatsia_predlozhenia.pptx
@@ -268,7 +268,7 @@
             <a:fld id="{A2C0772A-8435-40D0-8D87-2C2DB7B0E7B0}" type="datetimeFigureOut">
               <a:rPr lang="ru-RU" smtClean="0"/>
               <a:pPr/>
-              <a:t>17.06.2021</a:t>
+              <a:t>21.06.2021</a:t>
             </a:fld>
             <a:endParaRPr lang="ru-RU"/>
           </a:p>
@@ -440,7 +440,7 @@
             <a:fld id="{A2C0772A-8435-40D0-8D87-2C2DB7B0E7B0}" type="datetimeFigureOut">
               <a:rPr lang="ru-RU" smtClean="0"/>
               <a:pPr/>
-              <a:t>17.06.2021</a:t>
+              <a:t>21.06.2021</a:t>
             </a:fld>
             <a:endParaRPr lang="ru-RU"/>
           </a:p>
@@ -622,7 +622,7 @@
             <a:fld id="{A2C0772A-8435-40D0-8D87-2C2DB7B0E7B0}" type="datetimeFigureOut">
               <a:rPr lang="ru-RU" smtClean="0"/>
               <a:pPr/>
-              <a:t>17.06.2021</a:t>
+              <a:t>21.06.2021</a:t>
             </a:fld>
             <a:endParaRPr lang="ru-RU"/>
           </a:p>
@@ -794,7 +794,7 @@
             <a:fld id="{A2C0772A-8435-40D0-8D87-2C2DB7B0E7B0}" type="datetimeFigureOut">
               <a:rPr lang="ru-RU" smtClean="0"/>
               <a:pPr/>
-              <a:t>17.06.2021</a:t>
+              <a:t>21.06.2021</a:t>
             </a:fld>
             <a:endParaRPr lang="ru-RU"/>
           </a:p>
@@ -1042,7 +1042,7 @@
             <a:fld id="{A2C0772A-8435-40D0-8D87-2C2DB7B0E7B0}" type="datetimeFigureOut">
               <a:rPr lang="ru-RU" smtClean="0"/>
               <a:pPr/>
-              <a:t>17.06.2021</a:t>
+              <a:t>21.06.2021</a:t>
             </a:fld>
             <a:endParaRPr lang="ru-RU"/>
           </a:p>
@@ -1276,7 +1276,7 @@
             <a:fld id="{A2C0772A-8435-40D0-8D87-2C2DB7B0E7B0}" type="datetimeFigureOut">
               <a:rPr lang="ru-RU" smtClean="0"/>
               <a:pPr/>
-              <a:t>17.06.2021</a:t>
+              <a:t>21.06.2021</a:t>
             </a:fld>
             <a:endParaRPr lang="ru-RU"/>
           </a:p>
@@ -1645,7 +1645,7 @@
             <a:fld id="{A2C0772A-8435-40D0-8D87-2C2DB7B0E7B0}" type="datetimeFigureOut">
               <a:rPr lang="ru-RU" smtClean="0"/>
               <a:pPr/>
-              <a:t>17.06.2021</a:t>
+              <a:t>21.06.2021</a:t>
             </a:fld>
             <a:endParaRPr lang="ru-RU"/>
           </a:p>
@@ -1765,7 +1765,7 @@
             <a:fld id="{A2C0772A-8435-40D0-8D87-2C2DB7B0E7B0}" type="datetimeFigureOut">
               <a:rPr lang="ru-RU" smtClean="0"/>
               <a:pPr/>
-              <a:t>17.06.2021</a:t>
+              <a:t>21.06.2021</a:t>
             </a:fld>
             <a:endParaRPr lang="ru-RU"/>
           </a:p>
@@ -1862,7 +1862,7 @@
             <a:fld id="{A2C0772A-8435-40D0-8D87-2C2DB7B0E7B0}" type="datetimeFigureOut">
               <a:rPr lang="ru-RU" smtClean="0"/>
               <a:pPr/>
-              <a:t>17.06.2021</a:t>
+              <a:t>21.06.2021</a:t>
             </a:fld>
             <a:endParaRPr lang="ru-RU"/>
           </a:p>
@@ -2141,7 +2141,7 @@
             <a:fld id="{A2C0772A-8435-40D0-8D87-2C2DB7B0E7B0}" type="datetimeFigureOut">
               <a:rPr lang="ru-RU" smtClean="0"/>
               <a:pPr/>
-              <a:t>17.06.2021</a:t>
+              <a:t>21.06.2021</a:t>
             </a:fld>
             <a:endParaRPr lang="ru-RU"/>
           </a:p>
@@ -2400,7 +2400,7 @@
             <a:fld id="{A2C0772A-8435-40D0-8D87-2C2DB7B0E7B0}" type="datetimeFigureOut">
               <a:rPr lang="ru-RU" smtClean="0"/>
               <a:pPr/>
-              <a:t>17.06.2021</a:t>
+              <a:t>21.06.2021</a:t>
             </a:fld>
             <a:endParaRPr lang="ru-RU"/>
           </a:p>
@@ -2615,7 +2615,7 @@
             <a:fld id="{A2C0772A-8435-40D0-8D87-2C2DB7B0E7B0}" type="datetimeFigureOut">
               <a:rPr lang="ru-RU" smtClean="0"/>
               <a:pPr/>
-              <a:t>17.06.2021</a:t>
+              <a:t>21.06.2021</a:t>
             </a:fld>
             <a:endParaRPr lang="ru-RU"/>
           </a:p>
@@ -6354,7 +6354,7 @@
                 <a:latin typeface="Times New Roman" panose="02020603050405020304" pitchFamily="18" charset="0"/>
                 <a:cs typeface="Times New Roman" panose="02020603050405020304" pitchFamily="18" charset="0"/>
               </a:rPr>
-              <a:t>Алгоритмы имитации погрешностей весов</a:t>
+              <a:t>Распределения весов - имитация погрешностей</a:t>
             </a:r>
           </a:p>
         </p:txBody>

</xml_diff>